<commit_message>
Updated Slide Deck - pre dry-run
</commit_message>
<xml_diff>
--- a/16x9_DF2012_v3 - jQuery.pptx
+++ b/16x9_DF2012_v3 - jQuery.pptx
@@ -4704,9 +4704,6 @@
               </a:rPr>
               <a:t>Enhancing the User Experience with jQuery</a:t>
             </a:r>
-            <a:endParaRPr lang="en-US" dirty="0" smtClean="0">
-              <a:ea typeface="ＭＳ Ｐゴシック" pitchFamily="-97" charset="-128"/>
-            </a:endParaRPr>
           </a:p>
         </p:txBody>
       </p:sp>
@@ -4740,9 +4737,6 @@
               </a:rPr>
               <a:t>Helping developers with greater capabilities, more flexibility, and user adoption</a:t>
             </a:r>
-            <a:endParaRPr lang="en-US" dirty="0" smtClean="0">
-              <a:ea typeface="ＭＳ Ｐゴシック" pitchFamily="-97" charset="-128"/>
-            </a:endParaRPr>
           </a:p>
         </p:txBody>
       </p:sp>
@@ -4777,9 +4771,6 @@
               </a:rPr>
               <a:t>Andy Boettcher, Demand Chain Systems, Senior CRM Advisor</a:t>
             </a:r>
-            <a:endParaRPr lang="en-US" dirty="0" smtClean="0">
-              <a:ea typeface="ＭＳ Ｐゴシック" pitchFamily="-97" charset="-128"/>
-            </a:endParaRPr>
           </a:p>
         </p:txBody>
       </p:sp>
@@ -5269,9 +5260,6 @@
               </a:rPr>
               <a:t>Too much?  Finding the “Goldilocks Zone”</a:t>
             </a:r>
-            <a:endParaRPr lang="en-US" dirty="0" smtClean="0">
-              <a:ea typeface="ＭＳ Ｐゴシック" pitchFamily="-97" charset="-128"/>
-            </a:endParaRPr>
           </a:p>
         </p:txBody>
       </p:sp>
@@ -5619,9 +5607,6 @@
               </a:rPr>
               <a:t>How to get started with jQueryUI</a:t>
             </a:r>
-            <a:endParaRPr lang="en-US" dirty="0" smtClean="0">
-              <a:ea typeface="ＭＳ Ｐゴシック" pitchFamily="-97" charset="-128"/>
-            </a:endParaRPr>
           </a:p>
         </p:txBody>
       </p:sp>
@@ -5646,9 +5631,6 @@
               </a:rPr>
               <a:t>Static Resource</a:t>
             </a:r>
-            <a:endParaRPr lang="en-US" dirty="0" smtClean="0">
-              <a:ea typeface="ＭＳ Ｐゴシック" pitchFamily="-97" charset="-128"/>
-            </a:endParaRPr>
           </a:p>
           <a:p>
             <a:pPr lvl="1"/>
@@ -5667,9 +5649,6 @@
               </a:rPr>
               <a:t>Bundle core, widgets, and plugins in one file</a:t>
             </a:r>
-            <a:endParaRPr lang="en-US" dirty="0" smtClean="0">
-              <a:ea typeface="ヒラギノ角ゴ Pro W3" charset="-128"/>
-            </a:endParaRPr>
           </a:p>
           <a:p>
             <a:pPr lvl="1"/>
@@ -5679,9 +5658,6 @@
               </a:rPr>
               <a:t>Add to your org</a:t>
             </a:r>
-            <a:endParaRPr lang="en-US" dirty="0" smtClean="0">
-              <a:ea typeface="ヒラギノ角ゴ Pro W3" charset="-128"/>
-            </a:endParaRPr>
           </a:p>
           <a:p>
             <a:pPr lvl="1"/>
@@ -5803,9 +5779,6 @@
               </a:rPr>
               <a:t>Questions and open forum</a:t>
             </a:r>
-            <a:endParaRPr lang="en-US" dirty="0" smtClean="0">
-              <a:ea typeface="ＭＳ Ｐゴシック" pitchFamily="-97" charset="-128"/>
-            </a:endParaRPr>
           </a:p>
         </p:txBody>
       </p:sp>
@@ -5876,9 +5849,6 @@
               </a:rPr>
               <a:t>What have YOU done with jQuery / jQueryUI?</a:t>
             </a:r>
-            <a:endParaRPr lang="en-US" b="1" dirty="0" smtClean="0">
-              <a:ea typeface="ＭＳ Ｐゴシック" pitchFamily="-97" charset="-128"/>
-            </a:endParaRPr>
           </a:p>
         </p:txBody>
       </p:sp>
@@ -5943,9 +5913,6 @@
               </a:rPr>
               <a:t>Example 1:  Table sorting and inputs</a:t>
             </a:r>
-            <a:endParaRPr lang="en-US" dirty="0" smtClean="0">
-              <a:ea typeface="ＭＳ Ｐゴシック" pitchFamily="-97" charset="-128"/>
-            </a:endParaRPr>
           </a:p>
         </p:txBody>
       </p:sp>
@@ -6330,9 +6297,6 @@
               </a:rPr>
               <a:t>Example 1:  Sorting and inputs recap</a:t>
             </a:r>
-            <a:endParaRPr lang="en-US" dirty="0" smtClean="0">
-              <a:ea typeface="ＭＳ Ｐゴシック" pitchFamily="-97" charset="-128"/>
-            </a:endParaRPr>
           </a:p>
         </p:txBody>
       </p:sp>
@@ -6569,9 +6533,6 @@
               </a:rPr>
               <a:t>Example 2:  Status and modal dialogs</a:t>
             </a:r>
-            <a:endParaRPr lang="en-US" dirty="0" smtClean="0">
-              <a:ea typeface="ＭＳ Ｐゴシック" pitchFamily="-97" charset="-128"/>
-            </a:endParaRPr>
           </a:p>
         </p:txBody>
       </p:sp>
@@ -7123,9 +7084,6 @@
               </a:rPr>
               <a:t>Example 2:  Status and modal dialogs recap</a:t>
             </a:r>
-            <a:endParaRPr lang="en-US" dirty="0" smtClean="0">
-              <a:ea typeface="ＭＳ Ｐゴシック" pitchFamily="-97" charset="-128"/>
-            </a:endParaRPr>
           </a:p>
         </p:txBody>
       </p:sp>
@@ -7362,9 +7320,6 @@
               </a:rPr>
               <a:t>Example 3:  Drag and drop and HTML5</a:t>
             </a:r>
-            <a:endParaRPr lang="en-US" dirty="0" smtClean="0">
-              <a:ea typeface="ＭＳ Ｐゴシック" pitchFamily="-97" charset="-128"/>
-            </a:endParaRPr>
           </a:p>
         </p:txBody>
       </p:sp>
@@ -7784,9 +7739,6 @@
               </a:rPr>
               <a:t>Example 3:  Drag and drop / HTML5 recap</a:t>
             </a:r>
-            <a:endParaRPr lang="en-US" dirty="0" smtClean="0">
-              <a:ea typeface="ＭＳ Ｐゴシック" pitchFamily="-97" charset="-128"/>
-            </a:endParaRPr>
           </a:p>
         </p:txBody>
       </p:sp>
@@ -8023,9 +7975,6 @@
               </a:rPr>
               <a:t>Recap</a:t>
             </a:r>
-            <a:endParaRPr lang="en-US" dirty="0" smtClean="0">
-              <a:ea typeface="ＭＳ Ｐゴシック" pitchFamily="-97" charset="-128"/>
-            </a:endParaRPr>
           </a:p>
         </p:txBody>
       </p:sp>
@@ -8050,9 +7999,6 @@
               </a:rPr>
               <a:t>Why is it important to use technologies like jQuery / jQueryUI?</a:t>
             </a:r>
-            <a:endParaRPr lang="en-US" dirty="0" smtClean="0">
-              <a:ea typeface="ＭＳ Ｐゴシック" pitchFamily="-97" charset="-128"/>
-            </a:endParaRPr>
           </a:p>
           <a:p>
             <a:r>
@@ -8132,7 +8078,33 @@
               <a:rPr lang="en-US" dirty="0" smtClean="0">
                 <a:ea typeface="ＭＳ Ｐゴシック" pitchFamily="-97" charset="-128"/>
               </a:rPr>
-              <a:t>Reach out to bloggers and peers</a:t>
+              <a:t>Reach out to bloggers and </a:t>
+            </a:r>
+            <a:r>
+              <a:rPr lang="en-US" dirty="0" smtClean="0">
+                <a:ea typeface="ＭＳ Ｐゴシック" pitchFamily="-97" charset="-128"/>
+              </a:rPr>
+              <a:t>peers</a:t>
+            </a:r>
+          </a:p>
+          <a:p>
+            <a:r>
+              <a:rPr lang="en-US" dirty="0" err="1" smtClean="0">
+                <a:ea typeface="ＭＳ Ｐゴシック" pitchFamily="-97" charset="-128"/>
+              </a:rPr>
+              <a:t>Github</a:t>
+            </a:r>
+            <a:r>
+              <a:rPr lang="en-US" dirty="0" smtClean="0">
+                <a:ea typeface="ＭＳ Ｐゴシック" pitchFamily="-97" charset="-128"/>
+              </a:rPr>
+              <a:t> link - </a:t>
+            </a:r>
+            <a:r>
+              <a:rPr lang="en-US" dirty="0">
+                <a:hlinkClick r:id="rId2"/>
+              </a:rPr>
+              <a:t>https://github.com/techman97/SFDC_Code</a:t>
             </a:r>
             <a:endParaRPr lang="en-US" dirty="0" smtClean="0">
               <a:ea typeface="ヒラギノ角ゴ Pro W3" charset="-128"/>
@@ -8548,9 +8520,6 @@
               </a:rPr>
               <a:t>Introduction</a:t>
             </a:r>
-            <a:endParaRPr lang="en-US" dirty="0" smtClean="0">
-              <a:ea typeface="ＭＳ Ｐゴシック" pitchFamily="-97" charset="-128"/>
-            </a:endParaRPr>
           </a:p>
         </p:txBody>
       </p:sp>
@@ -8576,9 +8545,6 @@
               </a:rPr>
               <a:t>Andrew Boettcher</a:t>
             </a:r>
-            <a:endParaRPr lang="en-US" dirty="0" smtClean="0">
-              <a:ea typeface="ＭＳ Ｐゴシック" pitchFamily="-97" charset="-128"/>
-            </a:endParaRPr>
           </a:p>
           <a:p>
             <a:pPr lvl="1"/>
@@ -8588,9 +8554,6 @@
               </a:rPr>
               <a:t>Background</a:t>
             </a:r>
-            <a:endParaRPr lang="en-US" dirty="0" smtClean="0">
-              <a:ea typeface="ＭＳ Ｐゴシック" pitchFamily="-97" charset="-128"/>
-            </a:endParaRPr>
           </a:p>
           <a:p>
             <a:pPr lvl="2"/>
@@ -8600,9 +8563,6 @@
               </a:rPr>
               <a:t>Systems Engineer / Architect (MCSE)</a:t>
             </a:r>
-            <a:endParaRPr lang="en-US" dirty="0" smtClean="0">
-              <a:ea typeface="ヒラギノ角ゴ Pro W3" charset="-128"/>
-            </a:endParaRPr>
           </a:p>
           <a:p>
             <a:pPr lvl="2"/>
@@ -8621,9 +8581,6 @@
               </a:rPr>
               <a:t>VoIP Telephony Integrations</a:t>
             </a:r>
-            <a:endParaRPr lang="en-US" dirty="0" smtClean="0">
-              <a:ea typeface="ヒラギノ角ゴ Pro W3" charset="-128"/>
-            </a:endParaRPr>
           </a:p>
           <a:p>
             <a:pPr lvl="1"/>
@@ -8633,9 +8590,6 @@
               </a:rPr>
               <a:t>Rumblings and Aspirations</a:t>
             </a:r>
-            <a:endParaRPr lang="en-US" dirty="0" smtClean="0">
-              <a:ea typeface="ＭＳ Ｐゴシック" pitchFamily="-97" charset="-128"/>
-            </a:endParaRPr>
           </a:p>
           <a:p>
             <a:pPr lvl="2"/>
@@ -8645,9 +8599,6 @@
               </a:rPr>
               <a:t>Senior CRM Advisor, Demand Chain Systems (Minnesota)</a:t>
             </a:r>
-            <a:endParaRPr lang="en-US" dirty="0" smtClean="0">
-              <a:ea typeface="ヒラギノ角ゴ Pro W3" charset="-128"/>
-            </a:endParaRPr>
           </a:p>
           <a:p>
             <a:pPr lvl="2"/>
@@ -8657,9 +8608,6 @@
               </a:rPr>
               <a:t>Twin Cities (MN) Developer User Group Leader</a:t>
             </a:r>
-            <a:endParaRPr lang="en-US" dirty="0" smtClean="0">
-              <a:ea typeface="ヒラギノ角ゴ Pro W3" charset="-128"/>
-            </a:endParaRPr>
           </a:p>
           <a:p>
             <a:pPr lvl="2"/>
@@ -8669,9 +8617,6 @@
               </a:rPr>
               <a:t>Evangelizing Force.com – what a platform!</a:t>
             </a:r>
-            <a:endParaRPr lang="en-US" dirty="0" smtClean="0">
-              <a:ea typeface="ヒラギノ角ゴ Pro W3" charset="-128"/>
-            </a:endParaRPr>
           </a:p>
         </p:txBody>
       </p:sp>
@@ -8736,9 +8681,6 @@
               </a:rPr>
               <a:t>Demand Chain Systems</a:t>
             </a:r>
-            <a:endParaRPr lang="en-US" dirty="0" smtClean="0">
-              <a:ea typeface="ＭＳ Ｐゴシック" pitchFamily="-97" charset="-128"/>
-            </a:endParaRPr>
           </a:p>
         </p:txBody>
       </p:sp>
@@ -8805,9 +8747,6 @@
               </a:rPr>
               <a:t>If lasting CRM success was easy, everyone would already have it.  Demand Chain Systems brings a unique model-based structure which greatly simplifies CRM success.  Our approach is the perfect complement to the industry leading Salesforce.com platform.</a:t>
             </a:r>
-            <a:endParaRPr lang="en-US" dirty="0" smtClean="0">
-              <a:ea typeface="ＭＳ Ｐゴシック" pitchFamily="-97" charset="-128"/>
-            </a:endParaRPr>
           </a:p>
         </p:txBody>
       </p:sp>
@@ -8847,9 +8786,6 @@
               </a:rPr>
               <a:t>Structured Deployments</a:t>
             </a:r>
-            <a:endParaRPr lang="en-US" dirty="0" smtClean="0">
-              <a:ea typeface="ＭＳ Ｐゴシック" pitchFamily="-97" charset="-128"/>
-            </a:endParaRPr>
           </a:p>
           <a:p>
             <a:pPr marL="301625" indent="-301625"/>
@@ -8859,9 +8795,6 @@
               </a:rPr>
               <a:t>Lasting CRM Success</a:t>
             </a:r>
-            <a:endParaRPr lang="en-US" dirty="0" smtClean="0">
-              <a:ea typeface="ＭＳ Ｐゴシック" pitchFamily="-97" charset="-128"/>
-            </a:endParaRPr>
           </a:p>
         </p:txBody>
       </p:sp>
@@ -8921,9 +8854,6 @@
               </a:rPr>
               <a:t>Agenda</a:t>
             </a:r>
-            <a:endParaRPr lang="en-US" dirty="0" smtClean="0">
-              <a:ea typeface="ＭＳ Ｐゴシック" pitchFamily="-97" charset="-128"/>
-            </a:endParaRPr>
           </a:p>
         </p:txBody>
       </p:sp>
@@ -8949,9 +8879,6 @@
               </a:rPr>
               <a:t>What exactly are we doing here today?</a:t>
             </a:r>
-            <a:endParaRPr lang="en-US" dirty="0" smtClean="0">
-              <a:ea typeface="ＭＳ Ｐゴシック" pitchFamily="-97" charset="-128"/>
-            </a:endParaRPr>
           </a:p>
           <a:p>
             <a:pPr lvl="1"/>
@@ -9082,9 +9009,6 @@
               </a:rPr>
               <a:t>What is jQuery / jQueryUI?</a:t>
             </a:r>
-            <a:endParaRPr lang="en-US" dirty="0" smtClean="0">
-              <a:ea typeface="ＭＳ Ｐゴシック" pitchFamily="-97" charset="-128"/>
-            </a:endParaRPr>
           </a:p>
         </p:txBody>
       </p:sp>
@@ -9390,9 +9314,6 @@
               </a:rPr>
               <a:t>What REALLY is jQuery / jQueryUI?</a:t>
             </a:r>
-            <a:endParaRPr lang="en-US" dirty="0" smtClean="0">
-              <a:ea typeface="ＭＳ Ｐゴシック" pitchFamily="-97" charset="-128"/>
-            </a:endParaRPr>
           </a:p>
         </p:txBody>
       </p:sp>
@@ -9493,9 +9414,6 @@
               </a:rPr>
               <a:t>better</a:t>
             </a:r>
-            <a:endParaRPr lang="en-US" sz="2800" u="sng" dirty="0" smtClean="0">
-              <a:ea typeface="ヒラギノ角ゴ Pro W3" charset="-128"/>
-            </a:endParaRPr>
           </a:p>
         </p:txBody>
       </p:sp>
@@ -9560,9 +9478,6 @@
               </a:rPr>
               <a:t>jQueryUI – demos and documentation</a:t>
             </a:r>
-            <a:endParaRPr lang="en-US" dirty="0" smtClean="0">
-              <a:ea typeface="ＭＳ Ｐゴシック" pitchFamily="-97" charset="-128"/>
-            </a:endParaRPr>
           </a:p>
         </p:txBody>
       </p:sp>
@@ -9681,9 +9596,6 @@
               </a:rPr>
               <a:t>Why important?  Developers vs. Users</a:t>
             </a:r>
-            <a:endParaRPr lang="en-US" dirty="0" smtClean="0">
-              <a:ea typeface="ＭＳ Ｐゴシック" pitchFamily="-97" charset="-128"/>
-            </a:endParaRPr>
           </a:p>
         </p:txBody>
       </p:sp>

</xml_diff>

<commit_message>
Approved Deck and Plan
</commit_message>
<xml_diff>
--- a/16x9_DF2012_v3 - jQuery.pptx
+++ b/16x9_DF2012_v3 - jQuery.pptx
@@ -4776,7 +4776,7 @@
       </p:sp>
       <p:pic>
         <p:nvPicPr>
-          <p:cNvPr id="11" name="Picture 14" descr="Social_facebook.png"/>
+          <p:cNvPr id="12" name="Picture 17" descr="social_twitter.png"/>
           <p:cNvPicPr>
             <a:picLocks noChangeAspect="1"/>
           </p:cNvPicPr>
@@ -4797,7 +4797,7 @@
         </p:blipFill>
         <p:spPr bwMode="auto">
           <a:xfrm>
-            <a:off x="6065286" y="5206300"/>
+            <a:off x="6065286" y="5277891"/>
             <a:ext cx="401775" cy="401342"/>
           </a:xfrm>
           <a:prstGeom prst="rect">
@@ -4830,7 +4830,7 @@
       </p:pic>
       <p:pic>
         <p:nvPicPr>
-          <p:cNvPr id="12" name="Picture 17" descr="social_twitter.png"/>
+          <p:cNvPr id="13" name="Picture 20" descr="social_linkedin.png"/>
           <p:cNvPicPr>
             <a:picLocks noChangeAspect="1"/>
           </p:cNvPicPr>
@@ -4851,7 +4851,7 @@
         </p:blipFill>
         <p:spPr bwMode="auto">
           <a:xfrm>
-            <a:off x="6065286" y="5708778"/>
+            <a:off x="6065286" y="5820126"/>
             <a:ext cx="401775" cy="401342"/>
           </a:xfrm>
           <a:prstGeom prst="rect">
@@ -4884,9 +4884,9 @@
       </p:pic>
       <p:pic>
         <p:nvPicPr>
-          <p:cNvPr id="13" name="Picture 20" descr="social_linkedin.png"/>
+          <p:cNvPr id="14" name="Picture 16" descr="http://lorelleteaches.files.wordpress.com/2011/11/wplogo-blue-xl.png?w=584"/>
           <p:cNvPicPr>
-            <a:picLocks noChangeAspect="1"/>
+            <a:picLocks noChangeAspect="1" noChangeArrowheads="1"/>
           </p:cNvPicPr>
           <p:nvPr/>
         </p:nvPicPr>
@@ -4905,61 +4905,7 @@
         </p:blipFill>
         <p:spPr bwMode="auto">
           <a:xfrm>
-            <a:off x="6065286" y="6251013"/>
-            <a:ext cx="401775" cy="401342"/>
-          </a:xfrm>
-          <a:prstGeom prst="rect">
-            <a:avLst/>
-          </a:prstGeom>
-          <a:noFill/>
-          <a:ln>
-            <a:noFill/>
-          </a:ln>
-          <a:extLst>
-            <a:ext uri="{909E8E84-426E-40DD-AFC4-6F175D3DCCD1}">
-              <a14:hiddenFill xmlns:a14="http://schemas.microsoft.com/office/drawing/2010/main">
-                <a:solidFill>
-                  <a:srgbClr val="FFFFFF"/>
-                </a:solidFill>
-              </a14:hiddenFill>
-            </a:ext>
-            <a:ext uri="{91240B29-F687-4F45-9708-019B960494DF}">
-              <a14:hiddenLine xmlns:a14="http://schemas.microsoft.com/office/drawing/2010/main" w="9525">
-                <a:solidFill>
-                  <a:srgbClr val="000000"/>
-                </a:solidFill>
-                <a:miter lim="800000"/>
-                <a:headEnd/>
-                <a:tailEnd/>
-              </a14:hiddenLine>
-            </a:ext>
-          </a:extLst>
-        </p:spPr>
-      </p:pic>
-      <p:pic>
-        <p:nvPicPr>
-          <p:cNvPr id="14" name="Picture 16" descr="http://lorelleteaches.files.wordpress.com/2011/11/wplogo-blue-xl.png?w=584"/>
-          <p:cNvPicPr>
-            <a:picLocks noChangeAspect="1" noChangeArrowheads="1"/>
-          </p:cNvPicPr>
-          <p:nvPr/>
-        </p:nvPicPr>
-        <p:blipFill>
-          <a:blip r:embed="rId5">
-            <a:extLst>
-              <a:ext uri="{28A0092B-C50C-407E-A947-70E740481C1C}">
-                <a14:useLocalDpi xmlns:a14="http://schemas.microsoft.com/office/drawing/2010/main" val="0"/>
-              </a:ext>
-            </a:extLst>
-          </a:blip>
-          <a:srcRect/>
-          <a:stretch>
-            <a:fillRect/>
-          </a:stretch>
-        </p:blipFill>
-        <p:spPr bwMode="auto">
-          <a:xfrm>
-            <a:off x="6065285" y="6811478"/>
+            <a:off x="6065285" y="6380591"/>
             <a:ext cx="401775" cy="401775"/>
           </a:xfrm>
           <a:prstGeom prst="rect">
@@ -4992,48 +4938,13 @@
       </p:pic>
       <p:sp>
         <p:nvSpPr>
-          <p:cNvPr id="3" name="Rectangle 2"/>
-          <p:cNvSpPr/>
-          <p:nvPr/>
-        </p:nvSpPr>
-        <p:spPr>
-          <a:xfrm>
-            <a:off x="6603382" y="5176755"/>
-            <a:ext cx="3419526" cy="430887"/>
-          </a:xfrm>
-          <a:prstGeom prst="rect">
-            <a:avLst/>
-          </a:prstGeom>
-        </p:spPr>
-        <p:txBody>
-          <a:bodyPr wrap="none">
-            <a:spAutoFit/>
-          </a:bodyPr>
-          <a:lstStyle/>
-          <a:p>
-            <a:r>
-              <a:rPr lang="en-US" sz="2200" i="1" kern="0" dirty="0" smtClean="0">
-                <a:solidFill>
-                  <a:srgbClr val="FFFFFF"/>
-                </a:solidFill>
-                <a:latin typeface="Arial"/>
-                <a:ea typeface="ＭＳ Ｐゴシック" pitchFamily="-97" charset="-128"/>
-              </a:rPr>
-              <a:t>facebook.com/techman97</a:t>
-            </a:r>
-            <a:endParaRPr lang="en-US" dirty="0"/>
-          </a:p>
-        </p:txBody>
-      </p:sp>
-      <p:sp>
-        <p:nvSpPr>
           <p:cNvPr id="17" name="Rectangle 16"/>
           <p:cNvSpPr/>
           <p:nvPr/>
         </p:nvSpPr>
         <p:spPr>
           <a:xfrm>
-            <a:off x="6603382" y="5708778"/>
+            <a:off x="6603382" y="5277891"/>
             <a:ext cx="2262158" cy="430887"/>
           </a:xfrm>
           <a:prstGeom prst="rect">
@@ -5068,7 +4979,7 @@
         </p:nvSpPr>
         <p:spPr>
           <a:xfrm>
-            <a:off x="6603382" y="6236240"/>
+            <a:off x="6603382" y="5805353"/>
             <a:ext cx="2289409" cy="430887"/>
           </a:xfrm>
           <a:prstGeom prst="rect">
@@ -5113,7 +5024,7 @@
         </p:nvSpPr>
         <p:spPr>
           <a:xfrm>
-            <a:off x="6603382" y="6782366"/>
+            <a:off x="6603382" y="6351479"/>
             <a:ext cx="2587568" cy="430887"/>
           </a:xfrm>
           <a:prstGeom prst="rect">
@@ -5149,7 +5060,7 @@
           <p:nvPr/>
         </p:nvPicPr>
         <p:blipFill>
-          <a:blip r:embed="rId6"/>
+          <a:blip r:embed="rId5"/>
           <a:srcRect/>
           <a:stretch>
             <a:fillRect/>
@@ -5181,7 +5092,7 @@
           <p:nvPr/>
         </p:nvPicPr>
         <p:blipFill>
-          <a:blip r:embed="rId7"/>
+          <a:blip r:embed="rId6"/>
           <a:srcRect/>
           <a:stretch>
             <a:fillRect/>
@@ -5312,7 +5223,7 @@
               <a:t>jQuery components are never a focus, </a:t>
             </a:r>
             <a:r>
-              <a:rPr lang="en-US" sz="2800" u="sng" dirty="0">
+              <a:rPr lang="en-US" sz="2800" i="1" dirty="0">
                 <a:ea typeface="ＭＳ Ｐゴシック" pitchFamily="-97" charset="-128"/>
               </a:rPr>
               <a:t>they compliment</a:t>
@@ -5390,7 +5301,7 @@
               <a:t>jQuery is </a:t>
             </a:r>
             <a:r>
-              <a:rPr lang="en-US" sz="2800" u="sng" dirty="0">
+              <a:rPr lang="en-US" sz="2800" i="1" dirty="0">
                 <a:ea typeface="ＭＳ Ｐゴシック" pitchFamily="-97" charset="-128"/>
               </a:rPr>
               <a:t>open-source</a:t>
@@ -5421,7 +5332,7 @@
               <a:buChar char="–"/>
             </a:pPr>
             <a:r>
-              <a:rPr lang="en-US" sz="2800" u="sng" dirty="0">
+              <a:rPr lang="en-US" sz="2800" i="1" dirty="0">
                 <a:ea typeface="ＭＳ Ｐゴシック" pitchFamily="-97" charset="-128"/>
               </a:rPr>
               <a:t>Ask</a:t>
@@ -5433,7 +5344,7 @@
               <a:t> your users and </a:t>
             </a:r>
             <a:r>
-              <a:rPr lang="en-US" sz="2800" u="sng" dirty="0">
+              <a:rPr lang="en-US" sz="2800" i="1" dirty="0">
                 <a:ea typeface="ＭＳ Ｐゴシック" pitchFamily="-97" charset="-128"/>
               </a:rPr>
               <a:t>leverage</a:t>
@@ -5452,31 +5363,13 @@
               </a:buClr>
             </a:pPr>
             <a:r>
-              <a:rPr lang="en-US" sz="2000" dirty="0">
+              <a:rPr lang="en-US" sz="2000" u="sng" dirty="0">
                 <a:solidFill>
                   <a:srgbClr val="6B6B6B"/>
                 </a:solidFill>
                 <a:ea typeface="ＭＳ Ｐゴシック" pitchFamily="-97" charset="-128"/>
               </a:rPr>
-              <a:t>Be </a:t>
-            </a:r>
-            <a:r>
-              <a:rPr lang="en-US" sz="2000" u="sng" dirty="0">
-                <a:solidFill>
-                  <a:srgbClr val="6B6B6B"/>
-                </a:solidFill>
-                <a:ea typeface="ＭＳ Ｐゴシック" pitchFamily="-97" charset="-128"/>
-              </a:rPr>
-              <a:t>proactive</a:t>
-            </a:r>
-            <a:r>
-              <a:rPr lang="en-US" sz="2000" dirty="0">
-                <a:solidFill>
-                  <a:srgbClr val="6B6B6B"/>
-                </a:solidFill>
-                <a:ea typeface="ＭＳ Ｐゴシック" pitchFamily="-97" charset="-128"/>
-              </a:rPr>
-              <a:t>, not reactive!</a:t>
+              <a:t>Be proactive, not reactive!</a:t>
             </a:r>
           </a:p>
           <a:p>
@@ -6236,7 +6129,13 @@
               <a:rPr lang="en-US" dirty="0" smtClean="0">
                 <a:ea typeface="ＭＳ Ｐゴシック" pitchFamily="-97" charset="-128"/>
               </a:rPr>
-              <a:t>Widget:  Slider</a:t>
+              <a:t>Widget:  </a:t>
+            </a:r>
+            <a:r>
+              <a:rPr lang="en-US" dirty="0" smtClean="0">
+                <a:ea typeface="ＭＳ Ｐゴシック" pitchFamily="-97" charset="-128"/>
+              </a:rPr>
+              <a:t>Slider</a:t>
             </a:r>
           </a:p>
         </p:txBody>
@@ -6313,7 +6212,7 @@
         <p:spPr/>
         <p:txBody>
           <a:bodyPr>
-            <a:normAutofit lnSpcReduction="10000"/>
+            <a:normAutofit/>
           </a:bodyPr>
           <a:lstStyle/>
           <a:p>
@@ -6397,35 +6296,15 @@
               <a:rPr lang="en-US" sz="2400" dirty="0" smtClean="0">
                 <a:ea typeface="ＭＳ Ｐゴシック" pitchFamily="-97" charset="-128"/>
               </a:rPr>
-              <a:t>Think “Process”</a:t>
-            </a:r>
-          </a:p>
-          <a:p>
-            <a:pPr marL="800100" indent="-457200">
-              <a:buFont typeface="Arial" pitchFamily="34" charset="0"/>
-              <a:buChar char="•"/>
-            </a:pPr>
-            <a:r>
-              <a:rPr lang="en-US" dirty="0" smtClean="0">
-                <a:ea typeface="ＭＳ Ｐゴシック" pitchFamily="-97" charset="-128"/>
-              </a:rPr>
-              <a:t>Questions?</a:t>
-            </a:r>
-          </a:p>
-          <a:p>
-            <a:pPr marL="800100" indent="-457200">
-              <a:buFont typeface="Arial" pitchFamily="34" charset="0"/>
-              <a:buChar char="•"/>
-            </a:pPr>
-            <a:r>
-              <a:rPr lang="en-US" dirty="0" smtClean="0">
-                <a:ea typeface="ＭＳ Ｐゴシック" pitchFamily="-97" charset="-128"/>
-              </a:rPr>
-              <a:t>What do YOU think?</a:t>
-            </a:r>
-          </a:p>
-          <a:p>
-            <a:endParaRPr lang="en-US" dirty="0" smtClean="0">
+              <a:t>Think “Process</a:t>
+            </a:r>
+            <a:r>
+              <a:rPr lang="en-US" sz="2400" dirty="0" smtClean="0">
+                <a:ea typeface="ＭＳ Ｐゴシック" pitchFamily="-97" charset="-128"/>
+              </a:rPr>
+              <a:t>”</a:t>
+            </a:r>
+            <a:endParaRPr lang="en-US" sz="2400" dirty="0" smtClean="0">
               <a:ea typeface="ＭＳ Ｐゴシック" pitchFamily="-97" charset="-128"/>
             </a:endParaRPr>
           </a:p>
@@ -6790,8 +6669,29 @@
               <a:rPr lang="en-US" dirty="0" smtClean="0">
                 <a:ea typeface="ＭＳ Ｐゴシック" pitchFamily="-97" charset="-128"/>
               </a:rPr>
-              <a:t>Widget:  Modal Dialog</a:t>
-            </a:r>
+              <a:t>Widget:  Modal </a:t>
+            </a:r>
+            <a:r>
+              <a:rPr lang="en-US" dirty="0" smtClean="0">
+                <a:ea typeface="ＭＳ Ｐゴシック" pitchFamily="-97" charset="-128"/>
+              </a:rPr>
+              <a:t>Dialog</a:t>
+            </a:r>
+          </a:p>
+          <a:p>
+            <a:pPr marL="114300" indent="-457200">
+              <a:buFont typeface="Arial" pitchFamily="34" charset="0"/>
+              <a:buChar char="•"/>
+            </a:pPr>
+            <a:r>
+              <a:rPr lang="en-US" dirty="0" smtClean="0">
+                <a:ea typeface="ＭＳ Ｐゴシック" pitchFamily="-97" charset="-128"/>
+              </a:rPr>
+              <a:t>Widget:  Button</a:t>
+            </a:r>
+            <a:endParaRPr lang="en-US" dirty="0" smtClean="0">
+              <a:ea typeface="ＭＳ Ｐゴシック" pitchFamily="-97" charset="-128"/>
+            </a:endParaRPr>
           </a:p>
           <a:p>
             <a:pPr marL="114300" indent="-457200">
@@ -7100,7 +7000,7 @@
         <p:spPr/>
         <p:txBody>
           <a:bodyPr>
-            <a:normAutofit lnSpcReduction="10000"/>
+            <a:normAutofit/>
           </a:bodyPr>
           <a:lstStyle/>
           <a:p>
@@ -7184,35 +7084,15 @@
               <a:rPr lang="en-US" sz="2400" dirty="0" smtClean="0">
                 <a:ea typeface="ＭＳ Ｐゴシック" pitchFamily="-97" charset="-128"/>
               </a:rPr>
-              <a:t>Think “Process”</a:t>
-            </a:r>
-          </a:p>
-          <a:p>
-            <a:pPr marL="800100" indent="-457200">
-              <a:buFont typeface="Arial" pitchFamily="34" charset="0"/>
-              <a:buChar char="•"/>
-            </a:pPr>
-            <a:r>
-              <a:rPr lang="en-US" dirty="0" smtClean="0">
-                <a:ea typeface="ＭＳ Ｐゴシック" pitchFamily="-97" charset="-128"/>
-              </a:rPr>
-              <a:t>Questions?</a:t>
-            </a:r>
-          </a:p>
-          <a:p>
-            <a:pPr marL="800100" indent="-457200">
-              <a:buFont typeface="Arial" pitchFamily="34" charset="0"/>
-              <a:buChar char="•"/>
-            </a:pPr>
-            <a:r>
-              <a:rPr lang="en-US" dirty="0" smtClean="0">
-                <a:ea typeface="ＭＳ Ｐゴシック" pitchFamily="-97" charset="-128"/>
-              </a:rPr>
-              <a:t>What do YOU think?</a:t>
-            </a:r>
-          </a:p>
-          <a:p>
-            <a:endParaRPr lang="en-US" dirty="0" smtClean="0">
+              <a:t>Think “Process</a:t>
+            </a:r>
+            <a:r>
+              <a:rPr lang="en-US" sz="2400" dirty="0" smtClean="0">
+                <a:ea typeface="ＭＳ Ｐゴシック" pitchFamily="-97" charset="-128"/>
+              </a:rPr>
+              <a:t>”</a:t>
+            </a:r>
+            <a:endParaRPr lang="en-US" sz="2400" dirty="0" smtClean="0">
               <a:ea typeface="ＭＳ Ｐゴシック" pitchFamily="-97" charset="-128"/>
             </a:endParaRPr>
           </a:p>
@@ -7755,7 +7635,7 @@
         <p:spPr/>
         <p:txBody>
           <a:bodyPr>
-            <a:normAutofit lnSpcReduction="10000"/>
+            <a:normAutofit/>
           </a:bodyPr>
           <a:lstStyle/>
           <a:p>
@@ -7839,35 +7719,15 @@
               <a:rPr lang="en-US" sz="2400" dirty="0" smtClean="0">
                 <a:ea typeface="ＭＳ Ｐゴシック" pitchFamily="-97" charset="-128"/>
               </a:rPr>
-              <a:t>Think “Process”</a:t>
-            </a:r>
-          </a:p>
-          <a:p>
-            <a:pPr marL="800100" indent="-457200">
-              <a:buFont typeface="Arial" pitchFamily="34" charset="0"/>
-              <a:buChar char="•"/>
-            </a:pPr>
-            <a:r>
-              <a:rPr lang="en-US" dirty="0" smtClean="0">
-                <a:ea typeface="ＭＳ Ｐゴシック" pitchFamily="-97" charset="-128"/>
-              </a:rPr>
-              <a:t>Questions?</a:t>
-            </a:r>
-          </a:p>
-          <a:p>
-            <a:pPr marL="800100" indent="-457200">
-              <a:buFont typeface="Arial" pitchFamily="34" charset="0"/>
-              <a:buChar char="•"/>
-            </a:pPr>
-            <a:r>
-              <a:rPr lang="en-US" dirty="0" smtClean="0">
-                <a:ea typeface="ＭＳ Ｐゴシック" pitchFamily="-97" charset="-128"/>
-              </a:rPr>
-              <a:t>What do YOU think?</a:t>
-            </a:r>
-          </a:p>
-          <a:p>
-            <a:endParaRPr lang="en-US" dirty="0" smtClean="0">
+              <a:t>Think “Process</a:t>
+            </a:r>
+            <a:r>
+              <a:rPr lang="en-US" sz="2400" dirty="0" smtClean="0">
+                <a:ea typeface="ＭＳ Ｐゴシック" pitchFamily="-97" charset="-128"/>
+              </a:rPr>
+              <a:t>”</a:t>
+            </a:r>
+            <a:endParaRPr lang="en-US" sz="2400" dirty="0" smtClean="0">
               <a:ea typeface="ＭＳ Ｐゴシック" pitchFamily="-97" charset="-128"/>
             </a:endParaRPr>
           </a:p>
@@ -8078,13 +7938,7 @@
               <a:rPr lang="en-US" dirty="0" smtClean="0">
                 <a:ea typeface="ＭＳ Ｐゴシック" pitchFamily="-97" charset="-128"/>
               </a:rPr>
-              <a:t>Reach out to bloggers and </a:t>
-            </a:r>
-            <a:r>
-              <a:rPr lang="en-US" dirty="0" smtClean="0">
-                <a:ea typeface="ＭＳ Ｐゴシック" pitchFamily="-97" charset="-128"/>
-              </a:rPr>
-              <a:t>peers</a:t>
+              <a:t>Reach out to bloggers and peers</a:t>
             </a:r>
           </a:p>
           <a:p>
@@ -8849,11 +8703,20 @@
           <a:lstStyle/>
           <a:p>
             <a:r>
+              <a:rPr lang="en-US" dirty="0">
+                <a:ea typeface="ＭＳ Ｐゴシック" pitchFamily="-97" charset="-128"/>
+              </a:rPr>
+              <a:t>Agenda (http://</a:t>
+            </a:r>
+            <a:r>
               <a:rPr lang="en-US" dirty="0" smtClean="0">
                 <a:ea typeface="ＭＳ Ｐゴシック" pitchFamily="-97" charset="-128"/>
               </a:rPr>
-              <a:t>Agenda</a:t>
-            </a:r>
+              <a:t>bit.ly/NK8oNs)</a:t>
+            </a:r>
+            <a:endParaRPr lang="en-US" dirty="0" smtClean="0">
+              <a:ea typeface="ＭＳ Ｐゴシック" pitchFamily="-97" charset="-128"/>
+            </a:endParaRPr>
           </a:p>
         </p:txBody>
       </p:sp>

</xml_diff>

<commit_message>
Final Submission of Deck and Plan
</commit_message>
<xml_diff>
--- a/16x9_DF2012_v3 - jQuery.pptx
+++ b/16x9_DF2012_v3 - jQuery.pptx
@@ -389,7 +389,7 @@
     </p:spTree>
     <p:extLst>
       <p:ext uri="{BB962C8B-B14F-4D97-AF65-F5344CB8AC3E}">
-        <p14:creationId xmlns:p14="http://schemas.microsoft.com/office/powerpoint/2010/main" val="602510769"/>
+        <p14:creationId xmlns:p14="http://schemas.microsoft.com/office/powerpoint/2010/main" xmlns="" val="602510769"/>
       </p:ext>
     </p:extLst>
   </p:cSld>
@@ -720,7 +720,7 @@
     </p:spTree>
     <p:extLst>
       <p:ext uri="{BB962C8B-B14F-4D97-AF65-F5344CB8AC3E}">
-        <p14:creationId xmlns:p14="http://schemas.microsoft.com/office/powerpoint/2010/main" val="2550288968"/>
+        <p14:creationId xmlns:p14="http://schemas.microsoft.com/office/powerpoint/2010/main" xmlns="" val="2550288968"/>
       </p:ext>
     </p:extLst>
   </p:cSld>
@@ -4786,7 +4786,7 @@
           <a:blip r:embed="rId2">
             <a:extLst>
               <a:ext uri="{28A0092B-C50C-407E-A947-70E740481C1C}">
-                <a14:useLocalDpi xmlns:a14="http://schemas.microsoft.com/office/drawing/2010/main" val="0"/>
+                <a14:useLocalDpi xmlns:a14="http://schemas.microsoft.com/office/drawing/2010/main" xmlns="" val="0"/>
               </a:ext>
             </a:extLst>
           </a:blip>
@@ -4809,14 +4809,14 @@
           </a:ln>
           <a:extLst>
             <a:ext uri="{909E8E84-426E-40DD-AFC4-6F175D3DCCD1}">
-              <a14:hiddenFill xmlns:a14="http://schemas.microsoft.com/office/drawing/2010/main">
+              <a14:hiddenFill xmlns:a14="http://schemas.microsoft.com/office/drawing/2010/main" xmlns="">
                 <a:solidFill>
                   <a:srgbClr val="FFFFFF"/>
                 </a:solidFill>
               </a14:hiddenFill>
             </a:ext>
             <a:ext uri="{91240B29-F687-4F45-9708-019B960494DF}">
-              <a14:hiddenLine xmlns:a14="http://schemas.microsoft.com/office/drawing/2010/main" w="9525">
+              <a14:hiddenLine xmlns:a14="http://schemas.microsoft.com/office/drawing/2010/main" xmlns="" w="9525">
                 <a:solidFill>
                   <a:srgbClr val="000000"/>
                 </a:solidFill>
@@ -4840,7 +4840,7 @@
           <a:blip r:embed="rId3">
             <a:extLst>
               <a:ext uri="{28A0092B-C50C-407E-A947-70E740481C1C}">
-                <a14:useLocalDpi xmlns:a14="http://schemas.microsoft.com/office/drawing/2010/main" val="0"/>
+                <a14:useLocalDpi xmlns:a14="http://schemas.microsoft.com/office/drawing/2010/main" xmlns="" val="0"/>
               </a:ext>
             </a:extLst>
           </a:blip>
@@ -4863,14 +4863,14 @@
           </a:ln>
           <a:extLst>
             <a:ext uri="{909E8E84-426E-40DD-AFC4-6F175D3DCCD1}">
-              <a14:hiddenFill xmlns:a14="http://schemas.microsoft.com/office/drawing/2010/main">
+              <a14:hiddenFill xmlns:a14="http://schemas.microsoft.com/office/drawing/2010/main" xmlns="">
                 <a:solidFill>
                   <a:srgbClr val="FFFFFF"/>
                 </a:solidFill>
               </a14:hiddenFill>
             </a:ext>
             <a:ext uri="{91240B29-F687-4F45-9708-019B960494DF}">
-              <a14:hiddenLine xmlns:a14="http://schemas.microsoft.com/office/drawing/2010/main" w="9525">
+              <a14:hiddenLine xmlns:a14="http://schemas.microsoft.com/office/drawing/2010/main" xmlns="" w="9525">
                 <a:solidFill>
                   <a:srgbClr val="000000"/>
                 </a:solidFill>
@@ -4894,7 +4894,7 @@
           <a:blip r:embed="rId4">
             <a:extLst>
               <a:ext uri="{28A0092B-C50C-407E-A947-70E740481C1C}">
-                <a14:useLocalDpi xmlns:a14="http://schemas.microsoft.com/office/drawing/2010/main" val="0"/>
+                <a14:useLocalDpi xmlns:a14="http://schemas.microsoft.com/office/drawing/2010/main" xmlns="" val="0"/>
               </a:ext>
             </a:extLst>
           </a:blip>
@@ -4917,14 +4917,14 @@
           </a:ln>
           <a:extLst>
             <a:ext uri="{909E8E84-426E-40DD-AFC4-6F175D3DCCD1}">
-              <a14:hiddenFill xmlns:a14="http://schemas.microsoft.com/office/drawing/2010/main">
+              <a14:hiddenFill xmlns:a14="http://schemas.microsoft.com/office/drawing/2010/main" xmlns="">
                 <a:solidFill>
                   <a:srgbClr val="FFFFFF"/>
                 </a:solidFill>
               </a14:hiddenFill>
             </a:ext>
             <a:ext uri="{91240B29-F687-4F45-9708-019B960494DF}">
-              <a14:hiddenLine xmlns:a14="http://schemas.microsoft.com/office/drawing/2010/main" w="9525">
+              <a14:hiddenLine xmlns:a14="http://schemas.microsoft.com/office/drawing/2010/main" xmlns="" w="9525">
                 <a:solidFill>
                   <a:srgbClr val="000000"/>
                 </a:solidFill>
@@ -5442,7 +5442,7 @@
     </p:spTree>
     <p:extLst>
       <p:ext uri="{BB962C8B-B14F-4D97-AF65-F5344CB8AC3E}">
-        <p14:creationId xmlns:p14="http://schemas.microsoft.com/office/powerpoint/2010/main" val="1395708286"/>
+        <p14:creationId xmlns:p14="http://schemas.microsoft.com/office/powerpoint/2010/main" xmlns="" val="1395708286"/>
       </p:ext>
     </p:extLst>
   </p:cSld>
@@ -5614,7 +5614,7 @@
     </p:spTree>
     <p:extLst>
       <p:ext uri="{BB962C8B-B14F-4D97-AF65-F5344CB8AC3E}">
-        <p14:creationId xmlns:p14="http://schemas.microsoft.com/office/powerpoint/2010/main" val="1395708286"/>
+        <p14:creationId xmlns:p14="http://schemas.microsoft.com/office/powerpoint/2010/main" xmlns="" val="1395708286"/>
       </p:ext>
     </p:extLst>
   </p:cSld>
@@ -5748,7 +5748,7 @@
     </p:spTree>
     <p:extLst>
       <p:ext uri="{BB962C8B-B14F-4D97-AF65-F5344CB8AC3E}">
-        <p14:creationId xmlns:p14="http://schemas.microsoft.com/office/powerpoint/2010/main" val="4135531845"/>
+        <p14:creationId xmlns:p14="http://schemas.microsoft.com/office/powerpoint/2010/main" xmlns="" val="4135531845"/>
       </p:ext>
     </p:extLst>
   </p:cSld>
@@ -5821,7 +5821,7 @@
           <a:blip r:embed="rId2">
             <a:extLst>
               <a:ext uri="{28A0092B-C50C-407E-A947-70E740481C1C}">
-                <a14:useLocalDpi xmlns:a14="http://schemas.microsoft.com/office/drawing/2010/main" val="0"/>
+                <a14:useLocalDpi xmlns:a14="http://schemas.microsoft.com/office/drawing/2010/main" xmlns="" val="0"/>
               </a:ext>
             </a:extLst>
           </a:blip>
@@ -5844,14 +5844,14 @@
           </a:ln>
           <a:extLst>
             <a:ext uri="{909E8E84-426E-40DD-AFC4-6F175D3DCCD1}">
-              <a14:hiddenFill xmlns:a14="http://schemas.microsoft.com/office/drawing/2010/main">
+              <a14:hiddenFill xmlns:a14="http://schemas.microsoft.com/office/drawing/2010/main" xmlns="">
                 <a:solidFill>
                   <a:srgbClr val="FFFFFF"/>
                 </a:solidFill>
               </a14:hiddenFill>
             </a:ext>
             <a:ext uri="{91240B29-F687-4F45-9708-019B960494DF}">
-              <a14:hiddenLine xmlns:a14="http://schemas.microsoft.com/office/drawing/2010/main" w="9525">
+              <a14:hiddenLine xmlns:a14="http://schemas.microsoft.com/office/drawing/2010/main" xmlns="" w="9525">
                 <a:solidFill>
                   <a:srgbClr val="000000"/>
                 </a:solidFill>
@@ -6129,13 +6129,7 @@
               <a:rPr lang="en-US" dirty="0" smtClean="0">
                 <a:ea typeface="ＭＳ Ｐゴシック" pitchFamily="-97" charset="-128"/>
               </a:rPr>
-              <a:t>Widget:  </a:t>
-            </a:r>
-            <a:r>
-              <a:rPr lang="en-US" dirty="0" smtClean="0">
-                <a:ea typeface="ＭＳ Ｐゴシック" pitchFamily="-97" charset="-128"/>
-              </a:rPr>
-              <a:t>Slider</a:t>
+              <a:t>Widget:  Slider</a:t>
             </a:r>
           </a:p>
         </p:txBody>
@@ -6296,17 +6290,8 @@
               <a:rPr lang="en-US" sz="2400" dirty="0" smtClean="0">
                 <a:ea typeface="ＭＳ Ｐゴシック" pitchFamily="-97" charset="-128"/>
               </a:rPr>
-              <a:t>Think “Process</a:t>
-            </a:r>
-            <a:r>
-              <a:rPr lang="en-US" sz="2400" dirty="0" smtClean="0">
-                <a:ea typeface="ＭＳ Ｐゴシック" pitchFamily="-97" charset="-128"/>
-              </a:rPr>
-              <a:t>”</a:t>
-            </a:r>
-            <a:endParaRPr lang="en-US" sz="2400" dirty="0" smtClean="0">
-              <a:ea typeface="ＭＳ Ｐゴシック" pitchFamily="-97" charset="-128"/>
-            </a:endParaRPr>
+              <a:t>Think “Process”</a:t>
+            </a:r>
           </a:p>
         </p:txBody>
       </p:sp>
@@ -6322,7 +6307,7 @@
           <a:blip r:embed="rId2">
             <a:extLst>
               <a:ext uri="{28A0092B-C50C-407E-A947-70E740481C1C}">
-                <a14:useLocalDpi xmlns:a14="http://schemas.microsoft.com/office/drawing/2010/main" val="0"/>
+                <a14:useLocalDpi xmlns:a14="http://schemas.microsoft.com/office/drawing/2010/main" xmlns="" val="0"/>
               </a:ext>
             </a:extLst>
           </a:blip>
@@ -6342,7 +6327,7 @@
           <a:noFill/>
           <a:extLst>
             <a:ext uri="{909E8E84-426E-40DD-AFC4-6F175D3DCCD1}">
-              <a14:hiddenFill xmlns:a14="http://schemas.microsoft.com/office/drawing/2010/main">
+              <a14:hiddenFill xmlns:a14="http://schemas.microsoft.com/office/drawing/2010/main" xmlns="">
                 <a:solidFill>
                   <a:srgbClr val="FFFFFF"/>
                 </a:solidFill>
@@ -6354,7 +6339,7 @@
     </p:spTree>
     <p:extLst>
       <p:ext uri="{BB962C8B-B14F-4D97-AF65-F5344CB8AC3E}">
-        <p14:creationId xmlns:p14="http://schemas.microsoft.com/office/powerpoint/2010/main" val="3397788409"/>
+        <p14:creationId xmlns:p14="http://schemas.microsoft.com/office/powerpoint/2010/main" xmlns="" val="3397788409"/>
       </p:ext>
     </p:extLst>
   </p:cSld>
@@ -6669,13 +6654,7 @@
               <a:rPr lang="en-US" dirty="0" smtClean="0">
                 <a:ea typeface="ＭＳ Ｐゴシック" pitchFamily="-97" charset="-128"/>
               </a:rPr>
-              <a:t>Widget:  Modal </a:t>
-            </a:r>
-            <a:r>
-              <a:rPr lang="en-US" dirty="0" smtClean="0">
-                <a:ea typeface="ＭＳ Ｐゴシック" pitchFamily="-97" charset="-128"/>
-              </a:rPr>
-              <a:t>Dialog</a:t>
+              <a:t>Widget:  Modal Dialog</a:t>
             </a:r>
           </a:p>
           <a:p>
@@ -6689,9 +6668,6 @@
               </a:rPr>
               <a:t>Widget:  Button</a:t>
             </a:r>
-            <a:endParaRPr lang="en-US" dirty="0" smtClean="0">
-              <a:ea typeface="ＭＳ Ｐゴシック" pitchFamily="-97" charset="-128"/>
-            </a:endParaRPr>
           </a:p>
           <a:p>
             <a:pPr marL="114300" indent="-457200">
@@ -6719,7 +6695,7 @@
           <a:blip r:embed="rId2">
             <a:extLst>
               <a:ext uri="{28A0092B-C50C-407E-A947-70E740481C1C}">
-                <a14:useLocalDpi xmlns:a14="http://schemas.microsoft.com/office/drawing/2010/main" val="0"/>
+                <a14:useLocalDpi xmlns:a14="http://schemas.microsoft.com/office/drawing/2010/main" xmlns="" val="0"/>
               </a:ext>
             </a:extLst>
           </a:blip>
@@ -6742,14 +6718,14 @@
           </a:ln>
           <a:extLst>
             <a:ext uri="{909E8E84-426E-40DD-AFC4-6F175D3DCCD1}">
-              <a14:hiddenFill xmlns:a14="http://schemas.microsoft.com/office/drawing/2010/main">
+              <a14:hiddenFill xmlns:a14="http://schemas.microsoft.com/office/drawing/2010/main" xmlns="">
                 <a:solidFill>
                   <a:srgbClr val="FFFFFF"/>
                 </a:solidFill>
               </a14:hiddenFill>
             </a:ext>
             <a:ext uri="{91240B29-F687-4F45-9708-019B960494DF}">
-              <a14:hiddenLine xmlns:a14="http://schemas.microsoft.com/office/drawing/2010/main" w="9525">
+              <a14:hiddenLine xmlns:a14="http://schemas.microsoft.com/office/drawing/2010/main" xmlns="" w="9525">
                 <a:solidFill>
                   <a:srgbClr val="000000"/>
                 </a:solidFill>
@@ -6773,7 +6749,7 @@
           <a:blip r:embed="rId3">
             <a:extLst>
               <a:ext uri="{28A0092B-C50C-407E-A947-70E740481C1C}">
-                <a14:useLocalDpi xmlns:a14="http://schemas.microsoft.com/office/drawing/2010/main" val="0"/>
+                <a14:useLocalDpi xmlns:a14="http://schemas.microsoft.com/office/drawing/2010/main" xmlns="" val="0"/>
               </a:ext>
             </a:extLst>
           </a:blip>
@@ -6796,14 +6772,14 @@
           </a:ln>
           <a:extLst>
             <a:ext uri="{909E8E84-426E-40DD-AFC4-6F175D3DCCD1}">
-              <a14:hiddenFill xmlns:a14="http://schemas.microsoft.com/office/drawing/2010/main">
+              <a14:hiddenFill xmlns:a14="http://schemas.microsoft.com/office/drawing/2010/main" xmlns="">
                 <a:solidFill>
                   <a:srgbClr val="FFFFFF"/>
                 </a:solidFill>
               </a14:hiddenFill>
             </a:ext>
             <a:ext uri="{91240B29-F687-4F45-9708-019B960494DF}">
-              <a14:hiddenLine xmlns:a14="http://schemas.microsoft.com/office/drawing/2010/main" w="9525">
+              <a14:hiddenLine xmlns:a14="http://schemas.microsoft.com/office/drawing/2010/main" xmlns="" w="9525">
                 <a:solidFill>
                   <a:srgbClr val="000000"/>
                 </a:solidFill>
@@ -6827,7 +6803,7 @@
           <a:blip r:embed="rId4">
             <a:extLst>
               <a:ext uri="{28A0092B-C50C-407E-A947-70E740481C1C}">
-                <a14:useLocalDpi xmlns:a14="http://schemas.microsoft.com/office/drawing/2010/main" val="0"/>
+                <a14:useLocalDpi xmlns:a14="http://schemas.microsoft.com/office/drawing/2010/main" xmlns="" val="0"/>
               </a:ext>
             </a:extLst>
           </a:blip>
@@ -6850,14 +6826,14 @@
           </a:ln>
           <a:extLst>
             <a:ext uri="{909E8E84-426E-40DD-AFC4-6F175D3DCCD1}">
-              <a14:hiddenFill xmlns:a14="http://schemas.microsoft.com/office/drawing/2010/main">
+              <a14:hiddenFill xmlns:a14="http://schemas.microsoft.com/office/drawing/2010/main" xmlns="">
                 <a:solidFill>
                   <a:srgbClr val="FFFFFF"/>
                 </a:solidFill>
               </a14:hiddenFill>
             </a:ext>
             <a:ext uri="{91240B29-F687-4F45-9708-019B960494DF}">
-              <a14:hiddenLine xmlns:a14="http://schemas.microsoft.com/office/drawing/2010/main" w="9525">
+              <a14:hiddenLine xmlns:a14="http://schemas.microsoft.com/office/drawing/2010/main" xmlns="" w="9525">
                 <a:solidFill>
                   <a:srgbClr val="000000"/>
                 </a:solidFill>
@@ -6881,7 +6857,7 @@
           <a:blip r:embed="rId5">
             <a:extLst>
               <a:ext uri="{28A0092B-C50C-407E-A947-70E740481C1C}">
-                <a14:useLocalDpi xmlns:a14="http://schemas.microsoft.com/office/drawing/2010/main" val="0"/>
+                <a14:useLocalDpi xmlns:a14="http://schemas.microsoft.com/office/drawing/2010/main" xmlns="" val="0"/>
               </a:ext>
             </a:extLst>
           </a:blip>
@@ -6904,14 +6880,14 @@
           </a:ln>
           <a:extLst>
             <a:ext uri="{909E8E84-426E-40DD-AFC4-6F175D3DCCD1}">
-              <a14:hiddenFill xmlns:a14="http://schemas.microsoft.com/office/drawing/2010/main">
+              <a14:hiddenFill xmlns:a14="http://schemas.microsoft.com/office/drawing/2010/main" xmlns="">
                 <a:solidFill>
                   <a:srgbClr val="FFFFFF"/>
                 </a:solidFill>
               </a14:hiddenFill>
             </a:ext>
             <a:ext uri="{91240B29-F687-4F45-9708-019B960494DF}">
-              <a14:hiddenLine xmlns:a14="http://schemas.microsoft.com/office/drawing/2010/main" w="9525">
+              <a14:hiddenLine xmlns:a14="http://schemas.microsoft.com/office/drawing/2010/main" xmlns="" w="9525">
                 <a:solidFill>
                   <a:srgbClr val="000000"/>
                 </a:solidFill>
@@ -6926,7 +6902,7 @@
     </p:spTree>
     <p:extLst>
       <p:ext uri="{BB962C8B-B14F-4D97-AF65-F5344CB8AC3E}">
-        <p14:creationId xmlns:p14="http://schemas.microsoft.com/office/powerpoint/2010/main" val="207852804"/>
+        <p14:creationId xmlns:p14="http://schemas.microsoft.com/office/powerpoint/2010/main" xmlns="" val="207852804"/>
       </p:ext>
     </p:extLst>
   </p:cSld>
@@ -7084,17 +7060,8 @@
               <a:rPr lang="en-US" sz="2400" dirty="0" smtClean="0">
                 <a:ea typeface="ＭＳ Ｐゴシック" pitchFamily="-97" charset="-128"/>
               </a:rPr>
-              <a:t>Think “Process</a:t>
-            </a:r>
-            <a:r>
-              <a:rPr lang="en-US" sz="2400" dirty="0" smtClean="0">
-                <a:ea typeface="ＭＳ Ｐゴシック" pitchFamily="-97" charset="-128"/>
-              </a:rPr>
-              <a:t>”</a:t>
-            </a:r>
-            <a:endParaRPr lang="en-US" sz="2400" dirty="0" smtClean="0">
-              <a:ea typeface="ＭＳ Ｐゴシック" pitchFamily="-97" charset="-128"/>
-            </a:endParaRPr>
+              <a:t>Think “Process”</a:t>
+            </a:r>
           </a:p>
         </p:txBody>
       </p:sp>
@@ -7110,7 +7077,7 @@
           <a:blip r:embed="rId2">
             <a:extLst>
               <a:ext uri="{28A0092B-C50C-407E-A947-70E740481C1C}">
-                <a14:useLocalDpi xmlns:a14="http://schemas.microsoft.com/office/drawing/2010/main" val="0"/>
+                <a14:useLocalDpi xmlns:a14="http://schemas.microsoft.com/office/drawing/2010/main" xmlns="" val="0"/>
               </a:ext>
             </a:extLst>
           </a:blip>
@@ -7130,7 +7097,7 @@
           <a:noFill/>
           <a:extLst>
             <a:ext uri="{909E8E84-426E-40DD-AFC4-6F175D3DCCD1}">
-              <a14:hiddenFill xmlns:a14="http://schemas.microsoft.com/office/drawing/2010/main">
+              <a14:hiddenFill xmlns:a14="http://schemas.microsoft.com/office/drawing/2010/main" xmlns="">
                 <a:solidFill>
                   <a:srgbClr val="FFFFFF"/>
                 </a:solidFill>
@@ -7142,7 +7109,7 @@
     </p:spTree>
     <p:extLst>
       <p:ext uri="{BB962C8B-B14F-4D97-AF65-F5344CB8AC3E}">
-        <p14:creationId xmlns:p14="http://schemas.microsoft.com/office/powerpoint/2010/main" val="1434904244"/>
+        <p14:creationId xmlns:p14="http://schemas.microsoft.com/office/powerpoint/2010/main" xmlns="" val="1434904244"/>
       </p:ext>
     </p:extLst>
   </p:cSld>
@@ -7506,20 +7473,14 @@
       </p:sp>
       <p:pic>
         <p:nvPicPr>
-          <p:cNvPr id="10" name="Picture 1"/>
+          <p:cNvPr id="1028" name="Picture 4"/>
           <p:cNvPicPr>
             <a:picLocks noChangeAspect="1" noChangeArrowheads="1"/>
           </p:cNvPicPr>
           <p:nvPr/>
         </p:nvPicPr>
         <p:blipFill>
-          <a:blip r:embed="rId2">
-            <a:extLst>
-              <a:ext uri="{28A0092B-C50C-407E-A947-70E740481C1C}">
-                <a14:useLocalDpi xmlns:a14="http://schemas.microsoft.com/office/drawing/2010/main" val="0"/>
-              </a:ext>
-            </a:extLst>
-          </a:blip>
+          <a:blip r:embed="rId2"/>
           <a:srcRect/>
           <a:stretch>
             <a:fillRect/>
@@ -7527,41 +7488,25 @@
         </p:blipFill>
         <p:spPr bwMode="auto">
           <a:xfrm>
-            <a:off x="6345186" y="2338388"/>
-            <a:ext cx="7219950" cy="3552825"/>
+            <a:off x="6428796" y="2614613"/>
+            <a:ext cx="6924675" cy="3000375"/>
           </a:xfrm>
           <a:prstGeom prst="rect">
             <a:avLst/>
           </a:prstGeom>
           <a:noFill/>
-          <a:ln>
+          <a:ln w="9525">
             <a:noFill/>
+            <a:miter lim="800000"/>
+            <a:headEnd/>
+            <a:tailEnd/>
           </a:ln>
-          <a:extLst>
-            <a:ext uri="{909E8E84-426E-40DD-AFC4-6F175D3DCCD1}">
-              <a14:hiddenFill xmlns:a14="http://schemas.microsoft.com/office/drawing/2010/main">
-                <a:solidFill>
-                  <a:srgbClr val="FFFFFF"/>
-                </a:solidFill>
-              </a14:hiddenFill>
-            </a:ext>
-            <a:ext uri="{91240B29-F687-4F45-9708-019B960494DF}">
-              <a14:hiddenLine xmlns:a14="http://schemas.microsoft.com/office/drawing/2010/main" w="9525">
-                <a:solidFill>
-                  <a:srgbClr val="000000"/>
-                </a:solidFill>
-                <a:miter lim="800000"/>
-                <a:headEnd/>
-                <a:tailEnd/>
-              </a14:hiddenLine>
-            </a:ext>
-          </a:extLst>
         </p:spPr>
       </p:pic>
     </p:spTree>
     <p:extLst>
       <p:ext uri="{BB962C8B-B14F-4D97-AF65-F5344CB8AC3E}">
-        <p14:creationId xmlns:p14="http://schemas.microsoft.com/office/powerpoint/2010/main" val="3829487290"/>
+        <p14:creationId xmlns:p14="http://schemas.microsoft.com/office/powerpoint/2010/main" xmlns="" val="3829487290"/>
       </p:ext>
     </p:extLst>
   </p:cSld>
@@ -7719,17 +7664,8 @@
               <a:rPr lang="en-US" sz="2400" dirty="0" smtClean="0">
                 <a:ea typeface="ＭＳ Ｐゴシック" pitchFamily="-97" charset="-128"/>
               </a:rPr>
-              <a:t>Think “Process</a:t>
-            </a:r>
-            <a:r>
-              <a:rPr lang="en-US" sz="2400" dirty="0" smtClean="0">
-                <a:ea typeface="ＭＳ Ｐゴシック" pitchFamily="-97" charset="-128"/>
-              </a:rPr>
-              <a:t>”</a:t>
-            </a:r>
-            <a:endParaRPr lang="en-US" sz="2400" dirty="0" smtClean="0">
-              <a:ea typeface="ＭＳ Ｐゴシック" pitchFamily="-97" charset="-128"/>
-            </a:endParaRPr>
+              <a:t>Think “Process”</a:t>
+            </a:r>
           </a:p>
         </p:txBody>
       </p:sp>
@@ -7745,7 +7681,7 @@
           <a:blip r:embed="rId2">
             <a:extLst>
               <a:ext uri="{28A0092B-C50C-407E-A947-70E740481C1C}">
-                <a14:useLocalDpi xmlns:a14="http://schemas.microsoft.com/office/drawing/2010/main" val="0"/>
+                <a14:useLocalDpi xmlns:a14="http://schemas.microsoft.com/office/drawing/2010/main" xmlns="" val="0"/>
               </a:ext>
             </a:extLst>
           </a:blip>
@@ -7765,7 +7701,7 @@
           <a:noFill/>
           <a:extLst>
             <a:ext uri="{909E8E84-426E-40DD-AFC4-6F175D3DCCD1}">
-              <a14:hiddenFill xmlns:a14="http://schemas.microsoft.com/office/drawing/2010/main">
+              <a14:hiddenFill xmlns:a14="http://schemas.microsoft.com/office/drawing/2010/main" xmlns="">
                 <a:solidFill>
                   <a:srgbClr val="FFFFFF"/>
                 </a:solidFill>
@@ -7777,7 +7713,7 @@
     </p:spTree>
     <p:extLst>
       <p:ext uri="{BB962C8B-B14F-4D97-AF65-F5344CB8AC3E}">
-        <p14:creationId xmlns:p14="http://schemas.microsoft.com/office/powerpoint/2010/main" val="987202412"/>
+        <p14:creationId xmlns:p14="http://schemas.microsoft.com/office/powerpoint/2010/main" xmlns="" val="987202412"/>
       </p:ext>
     </p:extLst>
   </p:cSld>
@@ -7969,7 +7905,7 @@
     </p:spTree>
     <p:extLst>
       <p:ext uri="{BB962C8B-B14F-4D97-AF65-F5344CB8AC3E}">
-        <p14:creationId xmlns:p14="http://schemas.microsoft.com/office/powerpoint/2010/main" val="566068958"/>
+        <p14:creationId xmlns:p14="http://schemas.microsoft.com/office/powerpoint/2010/main" xmlns="" val="566068958"/>
       </p:ext>
     </p:extLst>
   </p:cSld>
@@ -8552,7 +8488,7 @@
           <a:blip r:embed="rId2">
             <a:extLst>
               <a:ext uri="{28A0092B-C50C-407E-A947-70E740481C1C}">
-                <a14:useLocalDpi xmlns:a14="http://schemas.microsoft.com/office/drawing/2010/main" val="0"/>
+                <a14:useLocalDpi xmlns:a14="http://schemas.microsoft.com/office/drawing/2010/main" xmlns="" val="0"/>
               </a:ext>
             </a:extLst>
           </a:blip>
@@ -8714,9 +8650,6 @@
               </a:rPr>
               <a:t>bit.ly/NK8oNs)</a:t>
             </a:r>
-            <a:endParaRPr lang="en-US" dirty="0" smtClean="0">
-              <a:ea typeface="ＭＳ Ｐゴシック" pitchFamily="-97" charset="-128"/>
-            </a:endParaRPr>
           </a:p>
         </p:txBody>
       </p:sp>
@@ -8814,7 +8747,7 @@
     </p:spTree>
     <p:extLst>
       <p:ext uri="{BB962C8B-B14F-4D97-AF65-F5344CB8AC3E}">
-        <p14:creationId xmlns:p14="http://schemas.microsoft.com/office/powerpoint/2010/main" val="1625995638"/>
+        <p14:creationId xmlns:p14="http://schemas.microsoft.com/office/powerpoint/2010/main" xmlns="" val="1625995638"/>
       </p:ext>
     </p:extLst>
   </p:cSld>
@@ -9118,7 +9051,7 @@
     </p:spTree>
     <p:extLst>
       <p:ext uri="{BB962C8B-B14F-4D97-AF65-F5344CB8AC3E}">
-        <p14:creationId xmlns:p14="http://schemas.microsoft.com/office/powerpoint/2010/main" val="1625995638"/>
+        <p14:creationId xmlns:p14="http://schemas.microsoft.com/office/powerpoint/2010/main" xmlns="" val="1625995638"/>
       </p:ext>
     </p:extLst>
   </p:cSld>
@@ -9283,7 +9216,7 @@
     </p:spTree>
     <p:extLst>
       <p:ext uri="{BB962C8B-B14F-4D97-AF65-F5344CB8AC3E}">
-        <p14:creationId xmlns:p14="http://schemas.microsoft.com/office/powerpoint/2010/main" val="1625995638"/>
+        <p14:creationId xmlns:p14="http://schemas.microsoft.com/office/powerpoint/2010/main" xmlns="" val="1625995638"/>
       </p:ext>
     </p:extLst>
   </p:cSld>
@@ -9356,7 +9289,7 @@
           <a:blip r:embed="rId2">
             <a:extLst>
               <a:ext uri="{28A0092B-C50C-407E-A947-70E740481C1C}">
-                <a14:useLocalDpi xmlns:a14="http://schemas.microsoft.com/office/drawing/2010/main" val="0"/>
+                <a14:useLocalDpi xmlns:a14="http://schemas.microsoft.com/office/drawing/2010/main" xmlns="" val="0"/>
               </a:ext>
             </a:extLst>
           </a:blip>
@@ -9379,14 +9312,14 @@
           </a:ln>
           <a:extLst>
             <a:ext uri="{909E8E84-426E-40DD-AFC4-6F175D3DCCD1}">
-              <a14:hiddenFill xmlns:a14="http://schemas.microsoft.com/office/drawing/2010/main">
+              <a14:hiddenFill xmlns:a14="http://schemas.microsoft.com/office/drawing/2010/main" xmlns="">
                 <a:solidFill>
                   <a:srgbClr val="FFFFFF"/>
                 </a:solidFill>
               </a14:hiddenFill>
             </a:ext>
             <a:ext uri="{91240B29-F687-4F45-9708-019B960494DF}">
-              <a14:hiddenLine xmlns:a14="http://schemas.microsoft.com/office/drawing/2010/main" w="9525">
+              <a14:hiddenLine xmlns:a14="http://schemas.microsoft.com/office/drawing/2010/main" xmlns="" w="9525">
                 <a:solidFill>
                   <a:srgbClr val="000000"/>
                 </a:solidFill>
@@ -9401,7 +9334,7 @@
     </p:spTree>
     <p:extLst>
       <p:ext uri="{BB962C8B-B14F-4D97-AF65-F5344CB8AC3E}">
-        <p14:creationId xmlns:p14="http://schemas.microsoft.com/office/powerpoint/2010/main" val="1625995638"/>
+        <p14:creationId xmlns:p14="http://schemas.microsoft.com/office/powerpoint/2010/main" xmlns="" val="1625995638"/>
       </p:ext>
     </p:extLst>
   </p:cSld>
@@ -9657,7 +9590,7 @@
     </p:spTree>
     <p:extLst>
       <p:ext uri="{BB962C8B-B14F-4D97-AF65-F5344CB8AC3E}">
-        <p14:creationId xmlns:p14="http://schemas.microsoft.com/office/powerpoint/2010/main" val="1395708286"/>
+        <p14:creationId xmlns:p14="http://schemas.microsoft.com/office/powerpoint/2010/main" xmlns="" val="1395708286"/>
       </p:ext>
     </p:extLst>
   </p:cSld>

</xml_diff>